<commit_message>
le jeudi 5 mai
</commit_message>
<xml_diff>
--- a/cours/25_kafka/kafka_connect_streams.pptx
+++ b/cours/25_kafka/kafka_connect_streams.pptx
@@ -6,22 +6,23 @@
     <p:sldMasterId id="2147483650" r:id="rId2"/>
   </p:sldMasterIdLst>
   <p:notesMasterIdLst>
-    <p:notesMasterId r:id="rId13"/>
+    <p:notesMasterId r:id="rId14"/>
   </p:notesMasterIdLst>
   <p:handoutMasterIdLst>
-    <p:handoutMasterId r:id="rId14"/>
+    <p:handoutMasterId r:id="rId15"/>
   </p:handoutMasterIdLst>
   <p:sldIdLst>
     <p:sldId id="256" r:id="rId3"/>
     <p:sldId id="259" r:id="rId4"/>
     <p:sldId id="260" r:id="rId5"/>
-    <p:sldId id="262" r:id="rId6"/>
-    <p:sldId id="264" r:id="rId7"/>
-    <p:sldId id="263" r:id="rId8"/>
-    <p:sldId id="265" r:id="rId9"/>
-    <p:sldId id="267" r:id="rId10"/>
-    <p:sldId id="266" r:id="rId11"/>
-    <p:sldId id="257" r:id="rId12"/>
+    <p:sldId id="268" r:id="rId6"/>
+    <p:sldId id="269" r:id="rId7"/>
+    <p:sldId id="262" r:id="rId8"/>
+    <p:sldId id="264" r:id="rId9"/>
+    <p:sldId id="263" r:id="rId10"/>
+    <p:sldId id="265" r:id="rId11"/>
+    <p:sldId id="267" r:id="rId12"/>
+    <p:sldId id="266" r:id="rId13"/>
   </p:sldIdLst>
   <p:sldSz cx="9144000" cy="6858000" type="screen4x3"/>
   <p:notesSz cx="6858000" cy="9144000"/>
@@ -838,11 +839,45 @@
           <a:bodyPr/>
           <a:lstStyle/>
           <a:p>
-            <a:endParaRPr lang="fr-FR" b="1" dirty="0">
-              <a:solidFill>
-                <a:srgbClr val="00499F"/>
-              </a:solidFill>
-            </a:endParaRPr>
+            <a:r>
+              <a:rPr lang="fr-FR" sz="1200" kern="1200" dirty="0">
+                <a:solidFill>
+                  <a:schemeClr val="tx1"/>
+                </a:solidFill>
+                <a:effectLst/>
+                <a:latin typeface="Arial" charset="0"/>
+                <a:ea typeface="+mn-ea"/>
+                <a:cs typeface="+mn-cs"/>
+              </a:rPr>
+              <a:t>(</a:t>
+            </a:r>
+            <a:r>
+              <a:rPr lang="fr-FR" sz="1200" b="1" kern="1200" dirty="0">
+                <a:solidFill>
+                  <a:schemeClr val="tx1"/>
+                </a:solidFill>
+                <a:effectLst/>
+                <a:latin typeface="Arial" charset="0"/>
+                <a:ea typeface="+mn-ea"/>
+                <a:cs typeface="+mn-cs"/>
+              </a:rPr>
+              <a:t>Transactional Data Hub</a:t>
+            </a:r>
+            <a:r>
+              <a:rPr lang="fr-FR" sz="1200" kern="1200" dirty="0">
+                <a:solidFill>
+                  <a:schemeClr val="tx1"/>
+                </a:solidFill>
+                <a:effectLst/>
+                <a:latin typeface="Arial" charset="0"/>
+                <a:ea typeface="+mn-ea"/>
+                <a:cs typeface="+mn-cs"/>
+              </a:rPr>
+              <a:t>), c’est-à-dire un hub dans lequel on peut gérer des cas d’usage streaming opérationnels, et pas seulement des cas d’usage décisionnels</a:t>
+            </a:r>
+          </a:p>
+          <a:p>
+            <a:endParaRPr lang="fr-FR" dirty="0"/>
           </a:p>
         </p:txBody>
       </p:sp>
@@ -864,7 +899,7 @@
             <a:fld id="{7CE2A13A-2852-41B3-AD68-15C80475E3D2}" type="slidenum">
               <a:rPr lang="ru-RU" smtClean="0"/>
               <a:pPr/>
-              <a:t>6</a:t>
+              <a:t>3</a:t>
             </a:fld>
             <a:endParaRPr lang="ru-RU"/>
           </a:p>
@@ -873,7 +908,7 @@
     </p:spTree>
     <p:extLst>
       <p:ext uri="{BB962C8B-B14F-4D97-AF65-F5344CB8AC3E}">
-        <p14:creationId xmlns:p14="http://schemas.microsoft.com/office/powerpoint/2010/main" val="2581570267"/>
+        <p14:creationId xmlns:p14="http://schemas.microsoft.com/office/powerpoint/2010/main" val="2159383401"/>
       </p:ext>
     </p:extLst>
   </p:cSld>
@@ -927,6 +962,265 @@
           <a:bodyPr/>
           <a:lstStyle/>
           <a:p>
+            <a:endParaRPr lang="fr-FR" dirty="0"/>
+          </a:p>
+        </p:txBody>
+      </p:sp>
+      <p:sp>
+        <p:nvSpPr>
+          <p:cNvPr id="4" name="Espace réservé du numéro de diapositive 3"/>
+          <p:cNvSpPr>
+            <a:spLocks noGrp="1"/>
+          </p:cNvSpPr>
+          <p:nvPr>
+            <p:ph type="sldNum" sz="quarter" idx="5"/>
+          </p:nvPr>
+        </p:nvSpPr>
+        <p:spPr/>
+        <p:txBody>
+          <a:bodyPr/>
+          <a:lstStyle/>
+          <a:p>
+            <a:fld id="{7CE2A13A-2852-41B3-AD68-15C80475E3D2}" type="slidenum">
+              <a:rPr lang="ru-RU" smtClean="0"/>
+              <a:pPr/>
+              <a:t>4</a:t>
+            </a:fld>
+            <a:endParaRPr lang="ru-RU"/>
+          </a:p>
+        </p:txBody>
+      </p:sp>
+    </p:spTree>
+    <p:extLst>
+      <p:ext uri="{BB962C8B-B14F-4D97-AF65-F5344CB8AC3E}">
+        <p14:creationId xmlns:p14="http://schemas.microsoft.com/office/powerpoint/2010/main" val="1544924655"/>
+      </p:ext>
+    </p:extLst>
+  </p:cSld>
+  <p:clrMapOvr>
+    <a:masterClrMapping/>
+  </p:clrMapOvr>
+</p:notes>
+</file>
+
+<file path=ppt/notesSlides/notesSlide3.xml><?xml version="1.0" encoding="utf-8"?>
+<p:notes xmlns:a="http://schemas.openxmlformats.org/drawingml/2006/main" xmlns:r="http://schemas.openxmlformats.org/officeDocument/2006/relationships" xmlns:p="http://schemas.openxmlformats.org/presentationml/2006/main">
+  <p:cSld>
+    <p:spTree>
+      <p:nvGrpSpPr>
+        <p:cNvPr id="1" name=""/>
+        <p:cNvGrpSpPr/>
+        <p:nvPr/>
+      </p:nvGrpSpPr>
+      <p:grpSpPr>
+        <a:xfrm>
+          <a:off x="0" y="0"/>
+          <a:ext cx="0" cy="0"/>
+          <a:chOff x="0" y="0"/>
+          <a:chExt cx="0" cy="0"/>
+        </a:xfrm>
+      </p:grpSpPr>
+      <p:sp>
+        <p:nvSpPr>
+          <p:cNvPr id="2" name="Espace réservé de l'image des diapositives 1"/>
+          <p:cNvSpPr>
+            <a:spLocks noGrp="1" noRot="1" noChangeAspect="1"/>
+          </p:cNvSpPr>
+          <p:nvPr>
+            <p:ph type="sldImg"/>
+          </p:nvPr>
+        </p:nvSpPr>
+        <p:spPr/>
+      </p:sp>
+      <p:sp>
+        <p:nvSpPr>
+          <p:cNvPr id="3" name="Espace réservé des notes 2"/>
+          <p:cNvSpPr>
+            <a:spLocks noGrp="1"/>
+          </p:cNvSpPr>
+          <p:nvPr>
+            <p:ph type="body" idx="1"/>
+          </p:nvPr>
+        </p:nvSpPr>
+        <p:spPr/>
+        <p:txBody>
+          <a:bodyPr/>
+          <a:lstStyle/>
+          <a:p>
+            <a:endParaRPr lang="fr-FR" dirty="0"/>
+          </a:p>
+        </p:txBody>
+      </p:sp>
+      <p:sp>
+        <p:nvSpPr>
+          <p:cNvPr id="4" name="Espace réservé du numéro de diapositive 3"/>
+          <p:cNvSpPr>
+            <a:spLocks noGrp="1"/>
+          </p:cNvSpPr>
+          <p:nvPr>
+            <p:ph type="sldNum" sz="quarter" idx="5"/>
+          </p:nvPr>
+        </p:nvSpPr>
+        <p:spPr/>
+        <p:txBody>
+          <a:bodyPr/>
+          <a:lstStyle/>
+          <a:p>
+            <a:fld id="{7CE2A13A-2852-41B3-AD68-15C80475E3D2}" type="slidenum">
+              <a:rPr lang="ru-RU" smtClean="0"/>
+              <a:pPr/>
+              <a:t>5</a:t>
+            </a:fld>
+            <a:endParaRPr lang="ru-RU"/>
+          </a:p>
+        </p:txBody>
+      </p:sp>
+    </p:spTree>
+    <p:extLst>
+      <p:ext uri="{BB962C8B-B14F-4D97-AF65-F5344CB8AC3E}">
+        <p14:creationId xmlns:p14="http://schemas.microsoft.com/office/powerpoint/2010/main" val="1548938278"/>
+      </p:ext>
+    </p:extLst>
+  </p:cSld>
+  <p:clrMapOvr>
+    <a:masterClrMapping/>
+  </p:clrMapOvr>
+</p:notes>
+</file>
+
+<file path=ppt/notesSlides/notesSlide4.xml><?xml version="1.0" encoding="utf-8"?>
+<p:notes xmlns:a="http://schemas.openxmlformats.org/drawingml/2006/main" xmlns:r="http://schemas.openxmlformats.org/officeDocument/2006/relationships" xmlns:p="http://schemas.openxmlformats.org/presentationml/2006/main">
+  <p:cSld>
+    <p:spTree>
+      <p:nvGrpSpPr>
+        <p:cNvPr id="1" name=""/>
+        <p:cNvGrpSpPr/>
+        <p:nvPr/>
+      </p:nvGrpSpPr>
+      <p:grpSpPr>
+        <a:xfrm>
+          <a:off x="0" y="0"/>
+          <a:ext cx="0" cy="0"/>
+          <a:chOff x="0" y="0"/>
+          <a:chExt cx="0" cy="0"/>
+        </a:xfrm>
+      </p:grpSpPr>
+      <p:sp>
+        <p:nvSpPr>
+          <p:cNvPr id="2" name="Espace réservé de l'image des diapositives 1"/>
+          <p:cNvSpPr>
+            <a:spLocks noGrp="1" noRot="1" noChangeAspect="1"/>
+          </p:cNvSpPr>
+          <p:nvPr>
+            <p:ph type="sldImg"/>
+          </p:nvPr>
+        </p:nvSpPr>
+        <p:spPr/>
+      </p:sp>
+      <p:sp>
+        <p:nvSpPr>
+          <p:cNvPr id="3" name="Espace réservé des notes 2"/>
+          <p:cNvSpPr>
+            <a:spLocks noGrp="1"/>
+          </p:cNvSpPr>
+          <p:nvPr>
+            <p:ph type="body" idx="1"/>
+          </p:nvPr>
+        </p:nvSpPr>
+        <p:spPr/>
+        <p:txBody>
+          <a:bodyPr/>
+          <a:lstStyle/>
+          <a:p>
+            <a:endParaRPr lang="fr-FR" b="1" dirty="0">
+              <a:solidFill>
+                <a:srgbClr val="00499F"/>
+              </a:solidFill>
+            </a:endParaRPr>
+          </a:p>
+        </p:txBody>
+      </p:sp>
+      <p:sp>
+        <p:nvSpPr>
+          <p:cNvPr id="4" name="Espace réservé du numéro de diapositive 3"/>
+          <p:cNvSpPr>
+            <a:spLocks noGrp="1"/>
+          </p:cNvSpPr>
+          <p:nvPr>
+            <p:ph type="sldNum" sz="quarter" idx="5"/>
+          </p:nvPr>
+        </p:nvSpPr>
+        <p:spPr/>
+        <p:txBody>
+          <a:bodyPr/>
+          <a:lstStyle/>
+          <a:p>
+            <a:fld id="{7CE2A13A-2852-41B3-AD68-15C80475E3D2}" type="slidenum">
+              <a:rPr lang="ru-RU" smtClean="0"/>
+              <a:pPr/>
+              <a:t>8</a:t>
+            </a:fld>
+            <a:endParaRPr lang="ru-RU"/>
+          </a:p>
+        </p:txBody>
+      </p:sp>
+    </p:spTree>
+    <p:extLst>
+      <p:ext uri="{BB962C8B-B14F-4D97-AF65-F5344CB8AC3E}">
+        <p14:creationId xmlns:p14="http://schemas.microsoft.com/office/powerpoint/2010/main" val="2581570267"/>
+      </p:ext>
+    </p:extLst>
+  </p:cSld>
+  <p:clrMapOvr>
+    <a:masterClrMapping/>
+  </p:clrMapOvr>
+</p:notes>
+</file>
+
+<file path=ppt/notesSlides/notesSlide5.xml><?xml version="1.0" encoding="utf-8"?>
+<p:notes xmlns:a="http://schemas.openxmlformats.org/drawingml/2006/main" xmlns:r="http://schemas.openxmlformats.org/officeDocument/2006/relationships" xmlns:p="http://schemas.openxmlformats.org/presentationml/2006/main">
+  <p:cSld>
+    <p:spTree>
+      <p:nvGrpSpPr>
+        <p:cNvPr id="1" name=""/>
+        <p:cNvGrpSpPr/>
+        <p:nvPr/>
+      </p:nvGrpSpPr>
+      <p:grpSpPr>
+        <a:xfrm>
+          <a:off x="0" y="0"/>
+          <a:ext cx="0" cy="0"/>
+          <a:chOff x="0" y="0"/>
+          <a:chExt cx="0" cy="0"/>
+        </a:xfrm>
+      </p:grpSpPr>
+      <p:sp>
+        <p:nvSpPr>
+          <p:cNvPr id="2" name="Espace réservé de l'image des diapositives 1"/>
+          <p:cNvSpPr>
+            <a:spLocks noGrp="1" noRot="1" noChangeAspect="1"/>
+          </p:cNvSpPr>
+          <p:nvPr>
+            <p:ph type="sldImg"/>
+          </p:nvPr>
+        </p:nvSpPr>
+        <p:spPr/>
+      </p:sp>
+      <p:sp>
+        <p:nvSpPr>
+          <p:cNvPr id="3" name="Espace réservé des notes 2"/>
+          <p:cNvSpPr>
+            <a:spLocks noGrp="1"/>
+          </p:cNvSpPr>
+          <p:nvPr>
+            <p:ph type="body" idx="1"/>
+          </p:nvPr>
+        </p:nvSpPr>
+        <p:spPr/>
+        <p:txBody>
+          <a:bodyPr/>
+          <a:lstStyle/>
+          <a:p>
             <a:pPr marL="0" marR="0" lvl="0" indent="0" algn="l" defTabSz="914400" rtl="0" eaLnBrk="1" fontAlgn="base" latinLnBrk="0" hangingPunct="1">
               <a:lnSpc>
                 <a:spcPct val="100000"/>
@@ -954,55 +1248,7 @@
                 <a:ea typeface="Times New Roman" panose="02020603050405020304" pitchFamily="18" charset="0"/>
                 <a:cs typeface="Times New Roman" panose="02020603050405020304" pitchFamily="18" charset="0"/>
               </a:rPr>
-              <a:t>La figure suivante récapitule l’architecture interne de Kafka </a:t>
-            </a:r>
-            <a:r>
-              <a:rPr lang="fr-FR" sz="1200" b="1" dirty="0" err="1">
-                <a:solidFill>
-                  <a:srgbClr val="00499F"/>
-                </a:solidFill>
-                <a:effectLst/>
-                <a:latin typeface="Calibri" panose="020F0502020204030204" pitchFamily="34" charset="0"/>
-                <a:ea typeface="Times New Roman" panose="02020603050405020304" pitchFamily="18" charset="0"/>
-                <a:cs typeface="Times New Roman" panose="02020603050405020304" pitchFamily="18" charset="0"/>
-              </a:rPr>
-              <a:t>Connect</a:t>
-            </a:r>
-            <a:r>
-              <a:rPr lang="fr-FR" sz="1200" b="1" dirty="0">
-                <a:solidFill>
-                  <a:srgbClr val="00499F"/>
-                </a:solidFill>
-                <a:effectLst/>
-                <a:latin typeface="Calibri" panose="020F0502020204030204" pitchFamily="34" charset="0"/>
-                <a:ea typeface="Times New Roman" panose="02020603050405020304" pitchFamily="18" charset="0"/>
-                <a:cs typeface="Times New Roman" panose="02020603050405020304" pitchFamily="18" charset="0"/>
-              </a:rPr>
-              <a:t> avec l’exemple d’une source de données, Oracle. L’utilisation de Kafka </a:t>
-            </a:r>
-            <a:r>
-              <a:rPr lang="fr-FR" sz="1200" b="1" dirty="0" err="1">
-                <a:solidFill>
-                  <a:srgbClr val="00499F"/>
-                </a:solidFill>
-                <a:effectLst/>
-                <a:latin typeface="Calibri" panose="020F0502020204030204" pitchFamily="34" charset="0"/>
-                <a:ea typeface="Times New Roman" panose="02020603050405020304" pitchFamily="18" charset="0"/>
-                <a:cs typeface="Times New Roman" panose="02020603050405020304" pitchFamily="18" charset="0"/>
-              </a:rPr>
-              <a:t>Connect</a:t>
-            </a:r>
-            <a:r>
-              <a:rPr lang="fr-FR" sz="1200" b="1" dirty="0">
-                <a:solidFill>
-                  <a:srgbClr val="00499F"/>
-                </a:solidFill>
-                <a:effectLst/>
-                <a:latin typeface="Calibri" panose="020F0502020204030204" pitchFamily="34" charset="0"/>
-                <a:ea typeface="Times New Roman" panose="02020603050405020304" pitchFamily="18" charset="0"/>
-                <a:cs typeface="Times New Roman" panose="02020603050405020304" pitchFamily="18" charset="0"/>
-              </a:rPr>
-              <a:t> revient à déclarer/supprimer les Connecteurs (indiquer la source de données à copier, les paramètres de connexion à cette source, le nombre de tâches, le topic de destination, …</a:t>
+              <a:t>La figure suivante récapitule l’architecture interne de Kafka Connect avec l’exemple d’une source de données, Oracle. L’utilisation de Kafka Connect revient à déclarer/supprimer les Connecteurs (indiquer la source de données à copier, les paramètres de connexion à cette source, le nombre de tâches, le topic de destination, …</a:t>
             </a:r>
             <a:r>
               <a:rPr lang="fr-FR" sz="1200" b="1" dirty="0" err="1">
@@ -1026,7 +1272,7 @@
                 <a:ea typeface="Times New Roman" panose="02020603050405020304" pitchFamily="18" charset="0"/>
                 <a:cs typeface="Times New Roman" panose="02020603050405020304" pitchFamily="18" charset="0"/>
               </a:rPr>
-              <a:t>) et les configurer via un fichier de configuration (mode standalone), ou via une API REST</a:t>
+              <a:t>) et les configurer via un fichier de configuration (mode standalone), </a:t>
             </a:r>
             <a:endParaRPr lang="fr-FR" b="1" dirty="0">
               <a:solidFill>
@@ -1057,7 +1303,7 @@
             <a:fld id="{7CE2A13A-2852-41B3-AD68-15C80475E3D2}" type="slidenum">
               <a:rPr lang="ru-RU" smtClean="0"/>
               <a:pPr/>
-              <a:t>8</a:t>
+              <a:t>10</a:t>
             </a:fld>
             <a:endParaRPr lang="ru-RU"/>
           </a:p>
@@ -6551,15 +6797,7 @@
           <a:p>
             <a:r>
               <a:rPr lang="fr-FR" sz="4800" dirty="0"/>
-              <a:t>KAFKA </a:t>
-            </a:r>
-            <a:r>
-              <a:rPr lang="fr-FR" sz="4800" dirty="0" err="1"/>
-              <a:t>Connect</a:t>
-            </a:r>
-            <a:r>
-              <a:rPr lang="fr-FR" sz="4800" dirty="0"/>
-              <a:t> &amp; </a:t>
+              <a:t>KAFKA Connect &amp; </a:t>
             </a:r>
             <a:br>
               <a:rPr lang="fr-FR" sz="4800" dirty="0"/>
@@ -6670,7 +6908,13 @@
       </p:grpSpPr>
       <p:sp>
         <p:nvSpPr>
-          <p:cNvPr id="36866" name="Rectangle 2"/>
+          <p:cNvPr id="5" name="Rectangle 2">
+            <a:extLst>
+              <a:ext uri="{FF2B5EF4-FFF2-40B4-BE49-F238E27FC236}">
+                <a16:creationId xmlns:a16="http://schemas.microsoft.com/office/drawing/2014/main" id="{5FEEB028-3548-442E-AE40-CB7374722608}"/>
+              </a:ext>
+            </a:extLst>
+          </p:cNvPr>
           <p:cNvSpPr>
             <a:spLocks noGrp="1" noChangeArrowheads="1"/>
           </p:cNvSpPr>
@@ -6680,8 +6924,8 @@
         </p:nvSpPr>
         <p:spPr>
           <a:xfrm>
-            <a:off x="901700" y="1125538"/>
-            <a:ext cx="4030663" cy="649287"/>
+            <a:off x="1908175" y="0"/>
+            <a:ext cx="6707188" cy="850900"/>
           </a:xfrm>
         </p:spPr>
         <p:txBody>
@@ -6689,98 +6933,274 @@
           <a:lstStyle/>
           <a:p>
             <a:r>
-              <a:rPr lang="en-US" dirty="0"/>
-              <a:t>Second Page</a:t>
-            </a:r>
-            <a:endParaRPr lang="uk-UA" dirty="0"/>
-          </a:p>
-        </p:txBody>
-      </p:sp>
-      <p:sp>
-        <p:nvSpPr>
-          <p:cNvPr id="36867" name="Rectangle 3"/>
-          <p:cNvSpPr>
-            <a:spLocks noGrp="1" noChangeArrowheads="1"/>
-          </p:cNvSpPr>
-          <p:nvPr>
-            <p:ph type="body" idx="1"/>
-          </p:nvPr>
+              <a:rPr lang="fr-FR" dirty="0">
+                <a:solidFill>
+                  <a:schemeClr val="tx2"/>
+                </a:solidFill>
+                <a:latin typeface="Arial" panose="020B0604020202020204" pitchFamily="34" charset="0"/>
+                <a:cs typeface="Arial" panose="020B0604020202020204" pitchFamily="34" charset="0"/>
+              </a:rPr>
+              <a:t>II. KAFKA CONNECT</a:t>
+            </a:r>
+            <a:endParaRPr lang="en-US" dirty="0">
+              <a:latin typeface="Arial" panose="020B0604020202020204" pitchFamily="34" charset="0"/>
+              <a:cs typeface="Arial" panose="020B0604020202020204" pitchFamily="34" charset="0"/>
+            </a:endParaRPr>
+          </a:p>
+        </p:txBody>
+      </p:sp>
+      <p:sp>
+        <p:nvSpPr>
+          <p:cNvPr id="8" name="ZoneTexte 7">
+            <a:extLst>
+              <a:ext uri="{FF2B5EF4-FFF2-40B4-BE49-F238E27FC236}">
+                <a16:creationId xmlns:a16="http://schemas.microsoft.com/office/drawing/2014/main" id="{B390C940-04C2-4FBA-9F78-EE4526438164}"/>
+              </a:ext>
+            </a:extLst>
+          </p:cNvPr>
+          <p:cNvSpPr txBox="1"/>
+          <p:nvPr/>
         </p:nvSpPr>
         <p:spPr>
           <a:xfrm>
-            <a:off x="611188" y="2349500"/>
-            <a:ext cx="8278812" cy="3960813"/>
+            <a:off x="1187624" y="850900"/>
+            <a:ext cx="3096344" cy="523220"/>
+          </a:xfrm>
+          <a:prstGeom prst="rect">
+            <a:avLst/>
+          </a:prstGeom>
+          <a:noFill/>
+        </p:spPr>
+        <p:txBody>
+          <a:bodyPr wrap="square" rtlCol="0">
+            <a:spAutoFit/>
+          </a:bodyPr>
+          <a:lstStyle/>
+          <a:p>
+            <a:r>
+              <a:rPr lang="fr-FR" sz="2800" b="0" dirty="0">
+                <a:solidFill>
+                  <a:schemeClr val="tx2"/>
+                </a:solidFill>
+              </a:rPr>
+              <a:t>1. Architecture</a:t>
+            </a:r>
+          </a:p>
+        </p:txBody>
+      </p:sp>
+      <p:pic>
+        <p:nvPicPr>
+          <p:cNvPr id="6" name="Image 5">
+            <a:extLst>
+              <a:ext uri="{FF2B5EF4-FFF2-40B4-BE49-F238E27FC236}">
+                <a16:creationId xmlns:a16="http://schemas.microsoft.com/office/drawing/2014/main" id="{BF8C5D17-42A5-4D12-92A1-47F7238FED0E}"/>
+              </a:ext>
+            </a:extLst>
+          </p:cNvPr>
+          <p:cNvPicPr>
+            <a:picLocks noChangeAspect="1"/>
+          </p:cNvPicPr>
+          <p:nvPr/>
+        </p:nvPicPr>
+        <p:blipFill rotWithShape="1">
+          <a:blip r:embed="rId3"/>
+          <a:srcRect l="5287" r="4049" b="4717"/>
+          <a:stretch/>
+        </p:blipFill>
+        <p:spPr bwMode="auto">
+          <a:xfrm>
+            <a:off x="232282" y="1844824"/>
+            <a:ext cx="8383081" cy="4680520"/>
+          </a:xfrm>
+          <a:prstGeom prst="rect">
+            <a:avLst/>
+          </a:prstGeom>
+          <a:ln w="9525" cap="flat" cmpd="sng" algn="ctr">
+            <a:solidFill>
+              <a:sysClr val="windowText" lastClr="000000"/>
+            </a:solidFill>
+            <a:prstDash val="solid"/>
+            <a:round/>
+            <a:headEnd type="none" w="med" len="med"/>
+            <a:tailEnd type="none" w="med" len="med"/>
+            <a:extLst>
+              <a:ext uri="{C807C97D-BFC1-408E-A445-0C87EB9F89A2}">
+                <ask:lineSketchStyleProps xmlns:ask="http://schemas.microsoft.com/office/drawing/2018/sketchyshapes" sd="0">
+                  <a:custGeom>
+                    <a:avLst/>
+                    <a:gdLst/>
+                    <a:ahLst/>
+                    <a:cxnLst/>
+                    <a:rect l="0" t="0" r="0" b="0"/>
+                    <a:pathLst/>
+                  </a:custGeom>
+                  <ask:type/>
+                </ask:lineSketchStyleProps>
+              </a:ext>
+            </a:extLst>
+          </a:ln>
+          <a:extLst>
+            <a:ext uri="{53640926-AAD7-44D8-BBD7-CCE9431645EC}">
+              <a14:shadowObscured xmlns:a14="http://schemas.microsoft.com/office/drawing/2010/main"/>
+            </a:ext>
+          </a:extLst>
+        </p:spPr>
+      </p:pic>
+    </p:spTree>
+    <p:extLst>
+      <p:ext uri="{BB962C8B-B14F-4D97-AF65-F5344CB8AC3E}">
+        <p14:creationId xmlns:p14="http://schemas.microsoft.com/office/powerpoint/2010/main" val="3772849579"/>
+      </p:ext>
+    </p:extLst>
+  </p:cSld>
+  <p:clrMapOvr>
+    <a:masterClrMapping/>
+  </p:clrMapOvr>
+</p:sld>
+</file>
+
+<file path=ppt/slides/slide11.xml><?xml version="1.0" encoding="utf-8"?>
+<p:sld xmlns:a="http://schemas.openxmlformats.org/drawingml/2006/main" xmlns:r="http://schemas.openxmlformats.org/officeDocument/2006/relationships" xmlns:p="http://schemas.openxmlformats.org/presentationml/2006/main">
+  <p:cSld>
+    <p:spTree>
+      <p:nvGrpSpPr>
+        <p:cNvPr id="1" name=""/>
+        <p:cNvGrpSpPr/>
+        <p:nvPr/>
+      </p:nvGrpSpPr>
+      <p:grpSpPr>
+        <a:xfrm>
+          <a:off x="0" y="0"/>
+          <a:ext cx="0" cy="0"/>
+          <a:chOff x="0" y="0"/>
+          <a:chExt cx="0" cy="0"/>
+        </a:xfrm>
+      </p:grpSpPr>
+      <p:sp>
+        <p:nvSpPr>
+          <p:cNvPr id="5" name="Rectangle 2">
+            <a:extLst>
+              <a:ext uri="{FF2B5EF4-FFF2-40B4-BE49-F238E27FC236}">
+                <a16:creationId xmlns:a16="http://schemas.microsoft.com/office/drawing/2014/main" id="{5FEEB028-3548-442E-AE40-CB7374722608}"/>
+              </a:ext>
+            </a:extLst>
+          </p:cNvPr>
+          <p:cNvSpPr>
+            <a:spLocks noGrp="1" noChangeArrowheads="1"/>
+          </p:cNvSpPr>
+          <p:nvPr>
+            <p:ph type="title"/>
+          </p:nvPr>
+        </p:nvSpPr>
+        <p:spPr>
+          <a:xfrm>
+            <a:off x="1908175" y="0"/>
+            <a:ext cx="6707188" cy="850900"/>
           </a:xfrm>
         </p:spPr>
         <p:txBody>
           <a:bodyPr/>
           <a:lstStyle/>
           <a:p>
-            <a:pPr>
-              <a:lnSpc>
-                <a:spcPct val="90000"/>
-              </a:lnSpc>
-            </a:pPr>
-            <a:r>
-              <a:rPr lang="en-US" altLang="ko-KR" dirty="0">
-                <a:ea typeface="굴림" charset="-127"/>
+            <a:r>
+              <a:rPr lang="fr-FR" dirty="0">
+                <a:solidFill>
+                  <a:schemeClr val="tx2"/>
+                </a:solidFill>
+                <a:latin typeface="Arial" panose="020B0604020202020204" pitchFamily="34" charset="0"/>
+                <a:cs typeface="Arial" panose="020B0604020202020204" pitchFamily="34" charset="0"/>
               </a:rPr>
-              <a:t>Your Text here</a:t>
-            </a:r>
-          </a:p>
-          <a:p>
-            <a:pPr>
-              <a:lnSpc>
-                <a:spcPct val="90000"/>
-              </a:lnSpc>
-            </a:pPr>
-            <a:endParaRPr lang="en-US" altLang="ko-KR" dirty="0">
-              <a:ea typeface="굴림" charset="-127"/>
+              <a:t>II. KAFKA CONNECT</a:t>
+            </a:r>
+            <a:endParaRPr lang="en-US" dirty="0">
+              <a:latin typeface="Arial" panose="020B0604020202020204" pitchFamily="34" charset="0"/>
+              <a:cs typeface="Arial" panose="020B0604020202020204" pitchFamily="34" charset="0"/>
             </a:endParaRPr>
           </a:p>
-          <a:p>
-            <a:pPr>
-              <a:lnSpc>
-                <a:spcPct val="90000"/>
-              </a:lnSpc>
-            </a:pPr>
-            <a:r>
-              <a:rPr lang="ru-RU" altLang="ko-KR" dirty="0">
-                <a:ea typeface="굴림" charset="-127"/>
+        </p:txBody>
+      </p:sp>
+      <p:sp>
+        <p:nvSpPr>
+          <p:cNvPr id="8" name="ZoneTexte 7">
+            <a:extLst>
+              <a:ext uri="{FF2B5EF4-FFF2-40B4-BE49-F238E27FC236}">
+                <a16:creationId xmlns:a16="http://schemas.microsoft.com/office/drawing/2014/main" id="{B390C940-04C2-4FBA-9F78-EE4526438164}"/>
+              </a:ext>
+            </a:extLst>
+          </p:cNvPr>
+          <p:cNvSpPr txBox="1"/>
+          <p:nvPr/>
+        </p:nvSpPr>
+        <p:spPr>
+          <a:xfrm>
+            <a:off x="1187624" y="850900"/>
+            <a:ext cx="3096344" cy="523220"/>
+          </a:xfrm>
+          <a:prstGeom prst="rect">
+            <a:avLst/>
+          </a:prstGeom>
+          <a:noFill/>
+        </p:spPr>
+        <p:txBody>
+          <a:bodyPr wrap="square" rtlCol="0">
+            <a:spAutoFit/>
+          </a:bodyPr>
+          <a:lstStyle/>
+          <a:p>
+            <a:r>
+              <a:rPr lang="fr-FR" sz="2800" b="0" dirty="0">
+                <a:solidFill>
+                  <a:schemeClr val="tx2"/>
+                </a:solidFill>
               </a:rPr>
-              <a:t>Lorem ipsum dolor sit amet, consectetuer adipiscing elit, sed diam nonummy nibh euismod tincidunt ut laoreet dolore magna aliquam erat volutpat. Ut wisi enim ad minim veniam, quis nostrud exerci tation ullamcorper suscipit lobortis nisl ut aliquip ex ea commodo consequat. </a:t>
-            </a:r>
-            <a:endParaRPr lang="en-US" altLang="ko-KR" dirty="0">
-              <a:ea typeface="굴림" charset="-127"/>
-            </a:endParaRPr>
-          </a:p>
-          <a:p>
-            <a:pPr>
-              <a:lnSpc>
-                <a:spcPct val="90000"/>
-              </a:lnSpc>
-            </a:pPr>
-            <a:endParaRPr lang="en-US" altLang="ko-KR" dirty="0">
-              <a:ea typeface="굴림" charset="-127"/>
-            </a:endParaRPr>
-          </a:p>
-          <a:p>
-            <a:pPr>
-              <a:lnSpc>
-                <a:spcPct val="90000"/>
-              </a:lnSpc>
-            </a:pPr>
-            <a:r>
-              <a:rPr lang="ru-RU" altLang="ko-KR" dirty="0">
-                <a:ea typeface="굴림" charset="-127"/>
-              </a:rPr>
-              <a:t>Duis autem vel eum iriure dolor in hendrerit in vulputate velit esse molestie consequat, vel illum dolore eu feugiat nulla facilisis at vero eros et accumsan et iusto odio dignissim qui blandit praesent luptatum zzril delenit augue duis dolore te feugait nulla facilisi. </a:t>
-            </a:r>
-            <a:endParaRPr lang="uk-UA" dirty="0"/>
-          </a:p>
-        </p:txBody>
-      </p:sp>
+              <a:t>1. Définition</a:t>
+            </a:r>
+          </a:p>
+        </p:txBody>
+      </p:sp>
+      <p:pic>
+        <p:nvPicPr>
+          <p:cNvPr id="4" name="Image 3">
+            <a:extLst>
+              <a:ext uri="{FF2B5EF4-FFF2-40B4-BE49-F238E27FC236}">
+                <a16:creationId xmlns:a16="http://schemas.microsoft.com/office/drawing/2014/main" id="{5086F259-8CF9-48EE-B16B-73832EAEAFCE}"/>
+              </a:ext>
+            </a:extLst>
+          </p:cNvPr>
+          <p:cNvPicPr/>
+          <p:nvPr/>
+        </p:nvPicPr>
+        <p:blipFill rotWithShape="1">
+          <a:blip r:embed="rId2"/>
+          <a:srcRect l="2050" t="2723" r="3137" b="7393"/>
+          <a:stretch/>
+        </p:blipFill>
+        <p:spPr bwMode="auto">
+          <a:xfrm>
+            <a:off x="179513" y="1701800"/>
+            <a:ext cx="7848872" cy="4751536"/>
+          </a:xfrm>
+          <a:prstGeom prst="rect">
+            <a:avLst/>
+          </a:prstGeom>
+          <a:ln>
+            <a:solidFill>
+              <a:schemeClr val="tx1"/>
+            </a:solidFill>
+          </a:ln>
+          <a:extLst>
+            <a:ext uri="{53640926-AAD7-44D8-BBD7-CCE9431645EC}">
+              <a14:shadowObscured xmlns:a14="http://schemas.microsoft.com/office/drawing/2010/main"/>
+            </a:ext>
+          </a:extLst>
+        </p:spPr>
+      </p:pic>
     </p:spTree>
+    <p:extLst>
+      <p:ext uri="{BB962C8B-B14F-4D97-AF65-F5344CB8AC3E}">
+        <p14:creationId xmlns:p14="http://schemas.microsoft.com/office/powerpoint/2010/main" val="2134043797"/>
+      </p:ext>
+    </p:extLst>
   </p:cSld>
   <p:clrMapOvr>
     <a:masterClrMapping/>
@@ -6907,7 +7327,7 @@
                 <a:ea typeface="굴림" charset="-127"/>
                 <a:cs typeface="Arial" panose="020B0604020202020204" pitchFamily="34" charset="0"/>
               </a:rPr>
-              <a:t>	2. Architecture</a:t>
+              <a:t>	2. Conditions</a:t>
             </a:r>
           </a:p>
           <a:p>
@@ -6923,7 +7343,23 @@
                 <a:ea typeface="굴림" charset="-127"/>
                 <a:cs typeface="Arial" panose="020B0604020202020204" pitchFamily="34" charset="0"/>
               </a:rPr>
-              <a:t>	3. Kstreams VS Ktable</a:t>
+              <a:t>	3. Architecture</a:t>
+            </a:r>
+          </a:p>
+          <a:p>
+            <a:pPr marL="0" indent="0">
+              <a:buNone/>
+            </a:pPr>
+            <a:r>
+              <a:rPr lang="en-US" altLang="ko-KR" dirty="0">
+                <a:solidFill>
+                  <a:schemeClr val="tx2"/>
+                </a:solidFill>
+                <a:latin typeface="Arial" panose="020B0604020202020204" pitchFamily="34" charset="0"/>
+                <a:ea typeface="굴림" charset="-127"/>
+                <a:cs typeface="Arial" panose="020B0604020202020204" pitchFamily="34" charset="0"/>
+              </a:rPr>
+              <a:t>	4. Kstreams VS Ktable</a:t>
             </a:r>
           </a:p>
           <a:p>
@@ -7065,8 +7501,8 @@
         </p:nvSpPr>
         <p:spPr>
           <a:xfrm>
-            <a:off x="863600" y="1484784"/>
-            <a:ext cx="7416800" cy="4605734"/>
+            <a:off x="323528" y="1268760"/>
+            <a:ext cx="7848872" cy="5544616"/>
           </a:xfrm>
         </p:spPr>
         <p:txBody>
@@ -7139,36 +7575,6 @@
                   <a:schemeClr val="tx2"/>
                 </a:solidFill>
                 <a:latin typeface="Arial" panose="020B0604020202020204" pitchFamily="34" charset="0"/>
-                <a:ea typeface="Times New Roman" panose="02020603050405020304" pitchFamily="18" charset="0"/>
-                <a:cs typeface="Arial" panose="020B0604020202020204" pitchFamily="34" charset="0"/>
-              </a:rPr>
-              <a:t>T</a:t>
-            </a:r>
-            <a:r>
-              <a:rPr lang="fr-FR" sz="2200" dirty="0">
-                <a:solidFill>
-                  <a:schemeClr val="tx2"/>
-                </a:solidFill>
-                <a:effectLst/>
-                <a:latin typeface="Arial" panose="020B0604020202020204" pitchFamily="34" charset="0"/>
-                <a:ea typeface="Times New Roman" panose="02020603050405020304" pitchFamily="18" charset="0"/>
-                <a:cs typeface="Arial" panose="020B0604020202020204" pitchFamily="34" charset="0"/>
-              </a:rPr>
-              <a:t>ransactionnelle (Plus qu’un consumer)</a:t>
-            </a:r>
-          </a:p>
-          <a:p>
-            <a:pPr>
-              <a:lnSpc>
-                <a:spcPct val="150000"/>
-              </a:lnSpc>
-            </a:pPr>
-            <a:r>
-              <a:rPr lang="fr-FR" sz="2200" dirty="0">
-                <a:solidFill>
-                  <a:schemeClr val="tx2"/>
-                </a:solidFill>
-                <a:latin typeface="Arial" panose="020B0604020202020204" pitchFamily="34" charset="0"/>
                 <a:cs typeface="Arial" panose="020B0604020202020204" pitchFamily="34" charset="0"/>
               </a:rPr>
               <a:t>Traitement unitaire des données au niveau des topics</a:t>
@@ -7198,7 +7604,7 @@
               </a:lnSpc>
             </a:pPr>
             <a:r>
-              <a:rPr lang="fr-FR" sz="2200" dirty="0">
+              <a:rPr lang="fr-FR" sz="2200" b="1" dirty="0">
                 <a:solidFill>
                   <a:schemeClr val="tx2"/>
                 </a:solidFill>
@@ -7223,6 +7629,23 @@
                 <a:cs typeface="Arial" panose="020B0604020202020204" pitchFamily="34" charset="0"/>
               </a:rPr>
               <a:t>Architectures complexes des projets telle que Lambda ne sont plus nécessaires</a:t>
+            </a:r>
+          </a:p>
+          <a:p>
+            <a:pPr>
+              <a:lnSpc>
+                <a:spcPct val="150000"/>
+              </a:lnSpc>
+            </a:pPr>
+            <a:r>
+              <a:rPr lang="fr-FR" sz="2200" dirty="0">
+                <a:solidFill>
+                  <a:schemeClr val="tx2"/>
+                </a:solidFill>
+                <a:latin typeface="Arial" panose="020B0604020202020204" pitchFamily="34" charset="0"/>
+                <a:cs typeface="Arial" panose="020B0604020202020204" pitchFamily="34" charset="0"/>
+              </a:rPr>
+              <a:t>Très faible latence =&gt; traitement en temps réel</a:t>
             </a:r>
           </a:p>
           <a:p>
@@ -7332,6 +7755,453 @@
 </file>
 
 <file path=ppt/slides/slide4.xml><?xml version="1.0" encoding="utf-8"?>
+<p:sld xmlns:a="http://schemas.openxmlformats.org/drawingml/2006/main" xmlns:r="http://schemas.openxmlformats.org/officeDocument/2006/relationships" xmlns:p="http://schemas.openxmlformats.org/presentationml/2006/main">
+  <p:cSld>
+    <p:spTree>
+      <p:nvGrpSpPr>
+        <p:cNvPr id="1" name=""/>
+        <p:cNvGrpSpPr/>
+        <p:nvPr/>
+      </p:nvGrpSpPr>
+      <p:grpSpPr>
+        <a:xfrm>
+          <a:off x="0" y="0"/>
+          <a:ext cx="0" cy="0"/>
+          <a:chOff x="0" y="0"/>
+          <a:chExt cx="0" cy="0"/>
+        </a:xfrm>
+      </p:grpSpPr>
+      <p:sp>
+        <p:nvSpPr>
+          <p:cNvPr id="5" name="Rectangle 2">
+            <a:extLst>
+              <a:ext uri="{FF2B5EF4-FFF2-40B4-BE49-F238E27FC236}">
+                <a16:creationId xmlns:a16="http://schemas.microsoft.com/office/drawing/2014/main" id="{5FEEB028-3548-442E-AE40-CB7374722608}"/>
+              </a:ext>
+            </a:extLst>
+          </p:cNvPr>
+          <p:cNvSpPr>
+            <a:spLocks noGrp="1" noChangeArrowheads="1"/>
+          </p:cNvSpPr>
+          <p:nvPr>
+            <p:ph type="title"/>
+          </p:nvPr>
+        </p:nvSpPr>
+        <p:spPr>
+          <a:xfrm>
+            <a:off x="1908175" y="0"/>
+            <a:ext cx="6707188" cy="850900"/>
+          </a:xfrm>
+        </p:spPr>
+        <p:txBody>
+          <a:bodyPr/>
+          <a:lstStyle/>
+          <a:p>
+            <a:r>
+              <a:rPr lang="fr-FR" dirty="0">
+                <a:solidFill>
+                  <a:schemeClr val="tx2"/>
+                </a:solidFill>
+                <a:latin typeface="Arial" panose="020B0604020202020204" pitchFamily="34" charset="0"/>
+                <a:cs typeface="Arial" panose="020B0604020202020204" pitchFamily="34" charset="0"/>
+              </a:rPr>
+              <a:t>I. KAFKA STREAMS</a:t>
+            </a:r>
+            <a:endParaRPr lang="en-US" dirty="0">
+              <a:latin typeface="Arial" panose="020B0604020202020204" pitchFamily="34" charset="0"/>
+              <a:cs typeface="Arial" panose="020B0604020202020204" pitchFamily="34" charset="0"/>
+            </a:endParaRPr>
+          </a:p>
+        </p:txBody>
+      </p:sp>
+      <p:sp>
+        <p:nvSpPr>
+          <p:cNvPr id="8" name="ZoneTexte 7">
+            <a:extLst>
+              <a:ext uri="{FF2B5EF4-FFF2-40B4-BE49-F238E27FC236}">
+                <a16:creationId xmlns:a16="http://schemas.microsoft.com/office/drawing/2014/main" id="{B390C940-04C2-4FBA-9F78-EE4526438164}"/>
+              </a:ext>
+            </a:extLst>
+          </p:cNvPr>
+          <p:cNvSpPr txBox="1"/>
+          <p:nvPr/>
+        </p:nvSpPr>
+        <p:spPr>
+          <a:xfrm>
+            <a:off x="1187624" y="850900"/>
+            <a:ext cx="6984776" cy="523220"/>
+          </a:xfrm>
+          <a:prstGeom prst="rect">
+            <a:avLst/>
+          </a:prstGeom>
+          <a:noFill/>
+        </p:spPr>
+        <p:txBody>
+          <a:bodyPr wrap="square" rtlCol="0">
+            <a:spAutoFit/>
+          </a:bodyPr>
+          <a:lstStyle/>
+          <a:p>
+            <a:r>
+              <a:rPr lang="fr-FR" sz="2800" b="0" dirty="0">
+                <a:solidFill>
+                  <a:schemeClr val="tx2"/>
+                </a:solidFill>
+              </a:rPr>
+              <a:t>1. Condition : Co-partitionnement</a:t>
+            </a:r>
+          </a:p>
+        </p:txBody>
+      </p:sp>
+      <p:pic>
+        <p:nvPicPr>
+          <p:cNvPr id="6" name="Image 5">
+            <a:extLst>
+              <a:ext uri="{FF2B5EF4-FFF2-40B4-BE49-F238E27FC236}">
+                <a16:creationId xmlns:a16="http://schemas.microsoft.com/office/drawing/2014/main" id="{F4F98B7C-3AA4-4F23-A5BE-CA1747EA20B9}"/>
+              </a:ext>
+            </a:extLst>
+          </p:cNvPr>
+          <p:cNvPicPr>
+            <a:picLocks noChangeAspect="1"/>
+          </p:cNvPicPr>
+          <p:nvPr/>
+        </p:nvPicPr>
+        <p:blipFill rotWithShape="1">
+          <a:blip r:embed="rId3">
+            <a:extLst>
+              <a:ext uri="{28A0092B-C50C-407E-A947-70E740481C1C}">
+                <a14:useLocalDpi xmlns:a14="http://schemas.microsoft.com/office/drawing/2010/main" val="0"/>
+              </a:ext>
+            </a:extLst>
+          </a:blip>
+          <a:srcRect l="9172" r="9662"/>
+          <a:stretch/>
+        </p:blipFill>
+        <p:spPr>
+          <a:xfrm>
+            <a:off x="323528" y="1471612"/>
+            <a:ext cx="5797152" cy="3914775"/>
+          </a:xfrm>
+          <a:prstGeom prst="rect">
+            <a:avLst/>
+          </a:prstGeom>
+          <a:ln>
+            <a:solidFill>
+              <a:schemeClr val="tx1"/>
+            </a:solidFill>
+          </a:ln>
+        </p:spPr>
+      </p:pic>
+      <p:sp>
+        <p:nvSpPr>
+          <p:cNvPr id="7" name="ZoneTexte 6">
+            <a:extLst>
+              <a:ext uri="{FF2B5EF4-FFF2-40B4-BE49-F238E27FC236}">
+                <a16:creationId xmlns:a16="http://schemas.microsoft.com/office/drawing/2014/main" id="{FA9F76D6-7079-4F21-963C-3F92330F98FF}"/>
+              </a:ext>
+            </a:extLst>
+          </p:cNvPr>
+          <p:cNvSpPr txBox="1"/>
+          <p:nvPr/>
+        </p:nvSpPr>
+        <p:spPr>
+          <a:xfrm>
+            <a:off x="6228184" y="2225020"/>
+            <a:ext cx="2808312" cy="3416320"/>
+          </a:xfrm>
+          <a:prstGeom prst="rect">
+            <a:avLst/>
+          </a:prstGeom>
+          <a:noFill/>
+        </p:spPr>
+        <p:txBody>
+          <a:bodyPr wrap="square" rtlCol="0">
+            <a:spAutoFit/>
+          </a:bodyPr>
+          <a:lstStyle/>
+          <a:p>
+            <a:pPr marL="342900" indent="-342900">
+              <a:buAutoNum type="arabicPeriod"/>
+            </a:pPr>
+            <a:r>
+              <a:rPr lang="fr-FR" dirty="0"/>
+              <a:t>Les clefs des messages ont le même schéma.</a:t>
+            </a:r>
+          </a:p>
+          <a:p>
+            <a:pPr marL="342900" indent="-342900">
+              <a:buAutoNum type="arabicPeriod"/>
+            </a:pPr>
+            <a:endParaRPr lang="fr-FR" dirty="0"/>
+          </a:p>
+          <a:p>
+            <a:pPr marL="342900" indent="-342900">
+              <a:buAutoNum type="arabicPeriod"/>
+            </a:pPr>
+            <a:r>
+              <a:rPr lang="fr-FR" dirty="0"/>
+              <a:t>Les topics qui les matérialisent ont le même nombre de partitions.</a:t>
+            </a:r>
+          </a:p>
+          <a:p>
+            <a:pPr marL="342900" indent="-342900">
+              <a:buAutoNum type="arabicPeriod"/>
+            </a:pPr>
+            <a:endParaRPr lang="fr-FR" dirty="0"/>
+          </a:p>
+          <a:p>
+            <a:pPr marL="342900" indent="-342900">
+              <a:buAutoNum type="arabicPeriod"/>
+            </a:pPr>
+            <a:r>
+              <a:rPr lang="fr-FR" dirty="0"/>
+              <a:t>Les producers de données utilisent le </a:t>
+            </a:r>
+            <a:r>
+              <a:rPr lang="fr-FR" dirty="0" err="1"/>
+              <a:t>DefaultPartitioner</a:t>
+            </a:r>
+            <a:endParaRPr lang="fr-FR" dirty="0"/>
+          </a:p>
+        </p:txBody>
+      </p:sp>
+      <p:sp>
+        <p:nvSpPr>
+          <p:cNvPr id="9" name="ZoneTexte 8">
+            <a:extLst>
+              <a:ext uri="{FF2B5EF4-FFF2-40B4-BE49-F238E27FC236}">
+                <a16:creationId xmlns:a16="http://schemas.microsoft.com/office/drawing/2014/main" id="{8D23A54B-86BD-46EB-91E0-0684CAB7ED05}"/>
+              </a:ext>
+            </a:extLst>
+          </p:cNvPr>
+          <p:cNvSpPr txBox="1"/>
+          <p:nvPr/>
+        </p:nvSpPr>
+        <p:spPr>
+          <a:xfrm>
+            <a:off x="1043608" y="5517232"/>
+            <a:ext cx="6696744" cy="369332"/>
+          </a:xfrm>
+          <a:prstGeom prst="rect">
+            <a:avLst/>
+          </a:prstGeom>
+          <a:noFill/>
+        </p:spPr>
+        <p:txBody>
+          <a:bodyPr wrap="square" rtlCol="0">
+            <a:spAutoFit/>
+          </a:bodyPr>
+          <a:lstStyle/>
+          <a:p>
+            <a:r>
+              <a:rPr lang="fr-FR" dirty="0"/>
+              <a:t>Exemple d’un bon co-partiotionnement de deux topics</a:t>
+            </a:r>
+          </a:p>
+        </p:txBody>
+      </p:sp>
+    </p:spTree>
+    <p:extLst>
+      <p:ext uri="{BB962C8B-B14F-4D97-AF65-F5344CB8AC3E}">
+        <p14:creationId xmlns:p14="http://schemas.microsoft.com/office/powerpoint/2010/main" val="3632523524"/>
+      </p:ext>
+    </p:extLst>
+  </p:cSld>
+  <p:clrMapOvr>
+    <a:masterClrMapping/>
+  </p:clrMapOvr>
+</p:sld>
+</file>
+
+<file path=ppt/slides/slide5.xml><?xml version="1.0" encoding="utf-8"?>
+<p:sld xmlns:a="http://schemas.openxmlformats.org/drawingml/2006/main" xmlns:r="http://schemas.openxmlformats.org/officeDocument/2006/relationships" xmlns:p="http://schemas.openxmlformats.org/presentationml/2006/main">
+  <p:cSld>
+    <p:spTree>
+      <p:nvGrpSpPr>
+        <p:cNvPr id="1" name=""/>
+        <p:cNvGrpSpPr/>
+        <p:nvPr/>
+      </p:nvGrpSpPr>
+      <p:grpSpPr>
+        <a:xfrm>
+          <a:off x="0" y="0"/>
+          <a:ext cx="0" cy="0"/>
+          <a:chOff x="0" y="0"/>
+          <a:chExt cx="0" cy="0"/>
+        </a:xfrm>
+      </p:grpSpPr>
+      <p:sp>
+        <p:nvSpPr>
+          <p:cNvPr id="5" name="Rectangle 2">
+            <a:extLst>
+              <a:ext uri="{FF2B5EF4-FFF2-40B4-BE49-F238E27FC236}">
+                <a16:creationId xmlns:a16="http://schemas.microsoft.com/office/drawing/2014/main" id="{5FEEB028-3548-442E-AE40-CB7374722608}"/>
+              </a:ext>
+            </a:extLst>
+          </p:cNvPr>
+          <p:cNvSpPr>
+            <a:spLocks noGrp="1" noChangeArrowheads="1"/>
+          </p:cNvSpPr>
+          <p:nvPr>
+            <p:ph type="title"/>
+          </p:nvPr>
+        </p:nvSpPr>
+        <p:spPr>
+          <a:xfrm>
+            <a:off x="1908175" y="0"/>
+            <a:ext cx="6707188" cy="850900"/>
+          </a:xfrm>
+        </p:spPr>
+        <p:txBody>
+          <a:bodyPr/>
+          <a:lstStyle/>
+          <a:p>
+            <a:r>
+              <a:rPr lang="fr-FR" dirty="0">
+                <a:solidFill>
+                  <a:schemeClr val="tx2"/>
+                </a:solidFill>
+                <a:latin typeface="Arial" panose="020B0604020202020204" pitchFamily="34" charset="0"/>
+                <a:cs typeface="Arial" panose="020B0604020202020204" pitchFamily="34" charset="0"/>
+              </a:rPr>
+              <a:t>I. KAFKA STREAMS</a:t>
+            </a:r>
+            <a:endParaRPr lang="en-US" dirty="0">
+              <a:latin typeface="Arial" panose="020B0604020202020204" pitchFamily="34" charset="0"/>
+              <a:cs typeface="Arial" panose="020B0604020202020204" pitchFamily="34" charset="0"/>
+            </a:endParaRPr>
+          </a:p>
+        </p:txBody>
+      </p:sp>
+      <p:sp>
+        <p:nvSpPr>
+          <p:cNvPr id="8" name="ZoneTexte 7">
+            <a:extLst>
+              <a:ext uri="{FF2B5EF4-FFF2-40B4-BE49-F238E27FC236}">
+                <a16:creationId xmlns:a16="http://schemas.microsoft.com/office/drawing/2014/main" id="{B390C940-04C2-4FBA-9F78-EE4526438164}"/>
+              </a:ext>
+            </a:extLst>
+          </p:cNvPr>
+          <p:cNvSpPr txBox="1"/>
+          <p:nvPr/>
+        </p:nvSpPr>
+        <p:spPr>
+          <a:xfrm>
+            <a:off x="1187624" y="850900"/>
+            <a:ext cx="6984776" cy="523220"/>
+          </a:xfrm>
+          <a:prstGeom prst="rect">
+            <a:avLst/>
+          </a:prstGeom>
+          <a:noFill/>
+        </p:spPr>
+        <p:txBody>
+          <a:bodyPr wrap="square" rtlCol="0">
+            <a:spAutoFit/>
+          </a:bodyPr>
+          <a:lstStyle/>
+          <a:p>
+            <a:r>
+              <a:rPr lang="fr-FR" sz="2800" b="0" dirty="0">
+                <a:solidFill>
+                  <a:schemeClr val="tx2"/>
+                </a:solidFill>
+              </a:rPr>
+              <a:t>1. Condition : Co-partitionnement</a:t>
+            </a:r>
+          </a:p>
+        </p:txBody>
+      </p:sp>
+      <p:pic>
+        <p:nvPicPr>
+          <p:cNvPr id="3" name="Image 2">
+            <a:extLst>
+              <a:ext uri="{FF2B5EF4-FFF2-40B4-BE49-F238E27FC236}">
+                <a16:creationId xmlns:a16="http://schemas.microsoft.com/office/drawing/2014/main" id="{6C92FD40-0002-4A90-B016-E9AE096EECD6}"/>
+              </a:ext>
+            </a:extLst>
+          </p:cNvPr>
+          <p:cNvPicPr>
+            <a:picLocks noChangeAspect="1"/>
+          </p:cNvPicPr>
+          <p:nvPr/>
+        </p:nvPicPr>
+        <p:blipFill rotWithShape="1">
+          <a:blip r:embed="rId3">
+            <a:extLst>
+              <a:ext uri="{28A0092B-C50C-407E-A947-70E740481C1C}">
+                <a14:useLocalDpi xmlns:a14="http://schemas.microsoft.com/office/drawing/2010/main" val="0"/>
+              </a:ext>
+            </a:extLst>
+          </a:blip>
+          <a:srcRect l="10626" r="12988"/>
+          <a:stretch/>
+        </p:blipFill>
+        <p:spPr>
+          <a:xfrm>
+            <a:off x="251520" y="1581150"/>
+            <a:ext cx="6984776" cy="3695700"/>
+          </a:xfrm>
+          <a:prstGeom prst="rect">
+            <a:avLst/>
+          </a:prstGeom>
+          <a:ln>
+            <a:solidFill>
+              <a:schemeClr val="tx1"/>
+            </a:solidFill>
+          </a:ln>
+        </p:spPr>
+      </p:pic>
+      <p:sp>
+        <p:nvSpPr>
+          <p:cNvPr id="4" name="ZoneTexte 3">
+            <a:extLst>
+              <a:ext uri="{FF2B5EF4-FFF2-40B4-BE49-F238E27FC236}">
+                <a16:creationId xmlns:a16="http://schemas.microsoft.com/office/drawing/2014/main" id="{3CBCB9A5-2520-4189-A291-DEF63D833A61}"/>
+              </a:ext>
+            </a:extLst>
+          </p:cNvPr>
+          <p:cNvSpPr txBox="1"/>
+          <p:nvPr/>
+        </p:nvSpPr>
+        <p:spPr>
+          <a:xfrm>
+            <a:off x="1043608" y="5517232"/>
+            <a:ext cx="6696744" cy="369332"/>
+          </a:xfrm>
+          <a:prstGeom prst="rect">
+            <a:avLst/>
+          </a:prstGeom>
+          <a:noFill/>
+        </p:spPr>
+        <p:txBody>
+          <a:bodyPr wrap="square" rtlCol="0">
+            <a:spAutoFit/>
+          </a:bodyPr>
+          <a:lstStyle/>
+          <a:p>
+            <a:r>
+              <a:rPr lang="fr-FR" dirty="0"/>
+              <a:t>Exemple d’un mauvais co-partiotionnement de deux topics</a:t>
+            </a:r>
+          </a:p>
+        </p:txBody>
+      </p:sp>
+    </p:spTree>
+    <p:extLst>
+      <p:ext uri="{BB962C8B-B14F-4D97-AF65-F5344CB8AC3E}">
+        <p14:creationId xmlns:p14="http://schemas.microsoft.com/office/powerpoint/2010/main" val="2907977250"/>
+      </p:ext>
+    </p:extLst>
+  </p:cSld>
+  <p:clrMapOvr>
+    <a:masterClrMapping/>
+  </p:clrMapOvr>
+</p:sld>
+</file>
+
+<file path=ppt/slides/slide6.xml><?xml version="1.0" encoding="utf-8"?>
 <p:sld xmlns:a="http://schemas.openxmlformats.org/drawingml/2006/main" xmlns:r="http://schemas.openxmlformats.org/officeDocument/2006/relationships" xmlns:p="http://schemas.openxmlformats.org/presentationml/2006/main">
   <p:cSld>
     <p:spTree>
@@ -7516,7 +8386,7 @@
 </p:sld>
 </file>
 
-<file path=ppt/slides/slide5.xml><?xml version="1.0" encoding="utf-8"?>
+<file path=ppt/slides/slide7.xml><?xml version="1.0" encoding="utf-8"?>
 <p:sld xmlns:a="http://schemas.openxmlformats.org/drawingml/2006/main" xmlns:r="http://schemas.openxmlformats.org/officeDocument/2006/relationships" xmlns:p="http://schemas.openxmlformats.org/presentationml/2006/main">
   <p:cSld>
     <p:spTree>
@@ -7741,7 +8611,7 @@
 </p:sld>
 </file>
 
-<file path=ppt/slides/slide6.xml><?xml version="1.0" encoding="utf-8"?>
+<file path=ppt/slides/slide8.xml><?xml version="1.0" encoding="utf-8"?>
 <p:sld xmlns:a="http://schemas.openxmlformats.org/drawingml/2006/main" xmlns:r="http://schemas.openxmlformats.org/officeDocument/2006/relationships" xmlns:p="http://schemas.openxmlformats.org/presentationml/2006/main">
   <p:cSld>
     <p:spTree>
@@ -7906,23 +8776,7 @@
                   <a:schemeClr val="tx2"/>
                 </a:solidFill>
               </a:rPr>
-              <a:t>Les données dans </a:t>
-            </a:r>
-            <a:r>
-              <a:rPr lang="fr-FR" b="0" dirty="0" err="1">
-                <a:solidFill>
-                  <a:schemeClr val="tx2"/>
-                </a:solidFill>
-              </a:rPr>
-              <a:t>kafka</a:t>
-            </a:r>
-            <a:r>
-              <a:rPr lang="fr-FR" b="0" dirty="0">
-                <a:solidFill>
-                  <a:schemeClr val="tx2"/>
-                </a:solidFill>
-              </a:rPr>
-              <a:t> classique sont des faits (aucun caractère de streaming)</a:t>
+              <a:t>Les données dans kafka classique sont des faits (aucun caractère de streaming)</a:t>
             </a:r>
           </a:p>
           <a:p>
@@ -7972,39 +8826,7 @@
                   <a:schemeClr val="tx2"/>
                 </a:solidFill>
               </a:rPr>
-              <a:t>Kafka </a:t>
-            </a:r>
-            <a:r>
-              <a:rPr lang="fr-FR" b="0" dirty="0" err="1">
-                <a:solidFill>
-                  <a:schemeClr val="tx2"/>
-                </a:solidFill>
-              </a:rPr>
-              <a:t>Connect</a:t>
-            </a:r>
-            <a:r>
-              <a:rPr lang="fr-FR" b="0" dirty="0">
-                <a:solidFill>
-                  <a:schemeClr val="tx2"/>
-                </a:solidFill>
-              </a:rPr>
-              <a:t> : une passerelle entre une grande variété de systèmes opérationnels (tels que les SGBDR, les ERP, les data </a:t>
-            </a:r>
-            <a:r>
-              <a:rPr lang="fr-FR" b="0" dirty="0" err="1">
-                <a:solidFill>
-                  <a:schemeClr val="tx2"/>
-                </a:solidFill>
-              </a:rPr>
-              <a:t>warehouse</a:t>
-            </a:r>
-            <a:r>
-              <a:rPr lang="fr-FR" b="0" dirty="0">
-                <a:solidFill>
-                  <a:schemeClr val="tx2"/>
-                </a:solidFill>
-              </a:rPr>
-              <a:t>, les outils de journalisation) et le Log de Kafka </a:t>
+              <a:t>Kafka Connect : une passerelle entre une grande variété de systèmes opérationnels (tels que les SGBDR, les ERP, les data warehouse, les outils de journalisation) et le Log de Kafka </a:t>
             </a:r>
           </a:p>
           <a:p>
@@ -8093,7 +8915,7 @@
 </p:sld>
 </file>
 
-<file path=ppt/slides/slide7.xml><?xml version="1.0" encoding="utf-8"?>
+<file path=ppt/slides/slide9.xml><?xml version="1.0" encoding="utf-8"?>
 <p:sld xmlns:a="http://schemas.openxmlformats.org/drawingml/2006/main" xmlns:r="http://schemas.openxmlformats.org/officeDocument/2006/relationships" xmlns:p="http://schemas.openxmlformats.org/presentationml/2006/main">
   <p:cSld>
     <p:spTree>
@@ -8235,288 +9057,6 @@
     <p:extLst>
       <p:ext uri="{BB962C8B-B14F-4D97-AF65-F5344CB8AC3E}">
         <p14:creationId xmlns:p14="http://schemas.microsoft.com/office/powerpoint/2010/main" val="3948761449"/>
-      </p:ext>
-    </p:extLst>
-  </p:cSld>
-  <p:clrMapOvr>
-    <a:masterClrMapping/>
-  </p:clrMapOvr>
-</p:sld>
-</file>
-
-<file path=ppt/slides/slide8.xml><?xml version="1.0" encoding="utf-8"?>
-<p:sld xmlns:a="http://schemas.openxmlformats.org/drawingml/2006/main" xmlns:r="http://schemas.openxmlformats.org/officeDocument/2006/relationships" xmlns:p="http://schemas.openxmlformats.org/presentationml/2006/main">
-  <p:cSld>
-    <p:spTree>
-      <p:nvGrpSpPr>
-        <p:cNvPr id="1" name=""/>
-        <p:cNvGrpSpPr/>
-        <p:nvPr/>
-      </p:nvGrpSpPr>
-      <p:grpSpPr>
-        <a:xfrm>
-          <a:off x="0" y="0"/>
-          <a:ext cx="0" cy="0"/>
-          <a:chOff x="0" y="0"/>
-          <a:chExt cx="0" cy="0"/>
-        </a:xfrm>
-      </p:grpSpPr>
-      <p:sp>
-        <p:nvSpPr>
-          <p:cNvPr id="5" name="Rectangle 2">
-            <a:extLst>
-              <a:ext uri="{FF2B5EF4-FFF2-40B4-BE49-F238E27FC236}">
-                <a16:creationId xmlns:a16="http://schemas.microsoft.com/office/drawing/2014/main" id="{5FEEB028-3548-442E-AE40-CB7374722608}"/>
-              </a:ext>
-            </a:extLst>
-          </p:cNvPr>
-          <p:cNvSpPr>
-            <a:spLocks noGrp="1" noChangeArrowheads="1"/>
-          </p:cNvSpPr>
-          <p:nvPr>
-            <p:ph type="title"/>
-          </p:nvPr>
-        </p:nvSpPr>
-        <p:spPr>
-          <a:xfrm>
-            <a:off x="1908175" y="0"/>
-            <a:ext cx="6707188" cy="850900"/>
-          </a:xfrm>
-        </p:spPr>
-        <p:txBody>
-          <a:bodyPr/>
-          <a:lstStyle/>
-          <a:p>
-            <a:r>
-              <a:rPr lang="fr-FR" dirty="0">
-                <a:solidFill>
-                  <a:schemeClr val="tx2"/>
-                </a:solidFill>
-                <a:latin typeface="Arial" panose="020B0604020202020204" pitchFamily="34" charset="0"/>
-                <a:cs typeface="Arial" panose="020B0604020202020204" pitchFamily="34" charset="0"/>
-              </a:rPr>
-              <a:t>II. KAFKA CONNECT</a:t>
-            </a:r>
-            <a:endParaRPr lang="en-US" dirty="0">
-              <a:latin typeface="Arial" panose="020B0604020202020204" pitchFamily="34" charset="0"/>
-              <a:cs typeface="Arial" panose="020B0604020202020204" pitchFamily="34" charset="0"/>
-            </a:endParaRPr>
-          </a:p>
-        </p:txBody>
-      </p:sp>
-      <p:sp>
-        <p:nvSpPr>
-          <p:cNvPr id="8" name="ZoneTexte 7">
-            <a:extLst>
-              <a:ext uri="{FF2B5EF4-FFF2-40B4-BE49-F238E27FC236}">
-                <a16:creationId xmlns:a16="http://schemas.microsoft.com/office/drawing/2014/main" id="{B390C940-04C2-4FBA-9F78-EE4526438164}"/>
-              </a:ext>
-            </a:extLst>
-          </p:cNvPr>
-          <p:cNvSpPr txBox="1"/>
-          <p:nvPr/>
-        </p:nvSpPr>
-        <p:spPr>
-          <a:xfrm>
-            <a:off x="1187624" y="850900"/>
-            <a:ext cx="3096344" cy="523220"/>
-          </a:xfrm>
-          <a:prstGeom prst="rect">
-            <a:avLst/>
-          </a:prstGeom>
-          <a:noFill/>
-        </p:spPr>
-        <p:txBody>
-          <a:bodyPr wrap="square" rtlCol="0">
-            <a:spAutoFit/>
-          </a:bodyPr>
-          <a:lstStyle/>
-          <a:p>
-            <a:r>
-              <a:rPr lang="fr-FR" sz="2800" b="0" dirty="0">
-                <a:solidFill>
-                  <a:schemeClr val="tx2"/>
-                </a:solidFill>
-              </a:rPr>
-              <a:t>1. Architecture</a:t>
-            </a:r>
-          </a:p>
-        </p:txBody>
-      </p:sp>
-      <p:pic>
-        <p:nvPicPr>
-          <p:cNvPr id="6" name="Image 5">
-            <a:extLst>
-              <a:ext uri="{FF2B5EF4-FFF2-40B4-BE49-F238E27FC236}">
-                <a16:creationId xmlns:a16="http://schemas.microsoft.com/office/drawing/2014/main" id="{BF8C5D17-42A5-4D12-92A1-47F7238FED0E}"/>
-              </a:ext>
-            </a:extLst>
-          </p:cNvPr>
-          <p:cNvPicPr>
-            <a:picLocks noChangeAspect="1"/>
-          </p:cNvPicPr>
-          <p:nvPr/>
-        </p:nvPicPr>
-        <p:blipFill rotWithShape="1">
-          <a:blip r:embed="rId3"/>
-          <a:srcRect l="5287" r="4049" b="4717"/>
-          <a:stretch/>
-        </p:blipFill>
-        <p:spPr bwMode="auto">
-          <a:xfrm>
-            <a:off x="232282" y="1844824"/>
-            <a:ext cx="8383081" cy="4680520"/>
-          </a:xfrm>
-          <a:prstGeom prst="rect">
-            <a:avLst/>
-          </a:prstGeom>
-          <a:ln w="9525" cap="flat" cmpd="sng" algn="ctr">
-            <a:solidFill>
-              <a:sysClr val="windowText" lastClr="000000"/>
-            </a:solidFill>
-            <a:prstDash val="solid"/>
-            <a:round/>
-            <a:headEnd type="none" w="med" len="med"/>
-            <a:tailEnd type="none" w="med" len="med"/>
-            <a:extLst>
-              <a:ext uri="{C807C97D-BFC1-408E-A445-0C87EB9F89A2}">
-                <ask:lineSketchStyleProps xmlns:ask="http://schemas.microsoft.com/office/drawing/2018/sketchyshapes" sd="0">
-                  <a:custGeom>
-                    <a:avLst/>
-                    <a:gdLst/>
-                    <a:ahLst/>
-                    <a:cxnLst/>
-                    <a:rect l="0" t="0" r="0" b="0"/>
-                    <a:pathLst/>
-                  </a:custGeom>
-                  <ask:type/>
-                </ask:lineSketchStyleProps>
-              </a:ext>
-            </a:extLst>
-          </a:ln>
-          <a:extLst>
-            <a:ext uri="{53640926-AAD7-44D8-BBD7-CCE9431645EC}">
-              <a14:shadowObscured xmlns:a14="http://schemas.microsoft.com/office/drawing/2010/main"/>
-            </a:ext>
-          </a:extLst>
-        </p:spPr>
-      </p:pic>
-    </p:spTree>
-    <p:extLst>
-      <p:ext uri="{BB962C8B-B14F-4D97-AF65-F5344CB8AC3E}">
-        <p14:creationId xmlns:p14="http://schemas.microsoft.com/office/powerpoint/2010/main" val="3772849579"/>
-      </p:ext>
-    </p:extLst>
-  </p:cSld>
-  <p:clrMapOvr>
-    <a:masterClrMapping/>
-  </p:clrMapOvr>
-</p:sld>
-</file>
-
-<file path=ppt/slides/slide9.xml><?xml version="1.0" encoding="utf-8"?>
-<p:sld xmlns:a="http://schemas.openxmlformats.org/drawingml/2006/main" xmlns:r="http://schemas.openxmlformats.org/officeDocument/2006/relationships" xmlns:p="http://schemas.openxmlformats.org/presentationml/2006/main">
-  <p:cSld>
-    <p:spTree>
-      <p:nvGrpSpPr>
-        <p:cNvPr id="1" name=""/>
-        <p:cNvGrpSpPr/>
-        <p:nvPr/>
-      </p:nvGrpSpPr>
-      <p:grpSpPr>
-        <a:xfrm>
-          <a:off x="0" y="0"/>
-          <a:ext cx="0" cy="0"/>
-          <a:chOff x="0" y="0"/>
-          <a:chExt cx="0" cy="0"/>
-        </a:xfrm>
-      </p:grpSpPr>
-      <p:sp>
-        <p:nvSpPr>
-          <p:cNvPr id="5" name="Rectangle 2">
-            <a:extLst>
-              <a:ext uri="{FF2B5EF4-FFF2-40B4-BE49-F238E27FC236}">
-                <a16:creationId xmlns:a16="http://schemas.microsoft.com/office/drawing/2014/main" id="{5FEEB028-3548-442E-AE40-CB7374722608}"/>
-              </a:ext>
-            </a:extLst>
-          </p:cNvPr>
-          <p:cNvSpPr>
-            <a:spLocks noGrp="1" noChangeArrowheads="1"/>
-          </p:cNvSpPr>
-          <p:nvPr>
-            <p:ph type="title"/>
-          </p:nvPr>
-        </p:nvSpPr>
-        <p:spPr>
-          <a:xfrm>
-            <a:off x="1908175" y="0"/>
-            <a:ext cx="6707188" cy="850900"/>
-          </a:xfrm>
-        </p:spPr>
-        <p:txBody>
-          <a:bodyPr/>
-          <a:lstStyle/>
-          <a:p>
-            <a:r>
-              <a:rPr lang="fr-FR" dirty="0">
-                <a:solidFill>
-                  <a:schemeClr val="tx2"/>
-                </a:solidFill>
-                <a:latin typeface="Arial" panose="020B0604020202020204" pitchFamily="34" charset="0"/>
-                <a:cs typeface="Arial" panose="020B0604020202020204" pitchFamily="34" charset="0"/>
-              </a:rPr>
-              <a:t>II. KAFKA CONNECT</a:t>
-            </a:r>
-            <a:endParaRPr lang="en-US" dirty="0">
-              <a:latin typeface="Arial" panose="020B0604020202020204" pitchFamily="34" charset="0"/>
-              <a:cs typeface="Arial" panose="020B0604020202020204" pitchFamily="34" charset="0"/>
-            </a:endParaRPr>
-          </a:p>
-        </p:txBody>
-      </p:sp>
-      <p:sp>
-        <p:nvSpPr>
-          <p:cNvPr id="8" name="ZoneTexte 7">
-            <a:extLst>
-              <a:ext uri="{FF2B5EF4-FFF2-40B4-BE49-F238E27FC236}">
-                <a16:creationId xmlns:a16="http://schemas.microsoft.com/office/drawing/2014/main" id="{B390C940-04C2-4FBA-9F78-EE4526438164}"/>
-              </a:ext>
-            </a:extLst>
-          </p:cNvPr>
-          <p:cNvSpPr txBox="1"/>
-          <p:nvPr/>
-        </p:nvSpPr>
-        <p:spPr>
-          <a:xfrm>
-            <a:off x="1187624" y="850900"/>
-            <a:ext cx="3096344" cy="523220"/>
-          </a:xfrm>
-          <a:prstGeom prst="rect">
-            <a:avLst/>
-          </a:prstGeom>
-          <a:noFill/>
-        </p:spPr>
-        <p:txBody>
-          <a:bodyPr wrap="square" rtlCol="0">
-            <a:spAutoFit/>
-          </a:bodyPr>
-          <a:lstStyle/>
-          <a:p>
-            <a:r>
-              <a:rPr lang="fr-FR" sz="2800" b="0" dirty="0">
-                <a:solidFill>
-                  <a:schemeClr val="tx2"/>
-                </a:solidFill>
-              </a:rPr>
-              <a:t>1. Définition</a:t>
-            </a:r>
-          </a:p>
-        </p:txBody>
-      </p:sp>
-    </p:spTree>
-    <p:extLst>
-      <p:ext uri="{BB962C8B-B14F-4D97-AF65-F5344CB8AC3E}">
-        <p14:creationId xmlns:p14="http://schemas.microsoft.com/office/powerpoint/2010/main" val="2134043797"/>
       </p:ext>
     </p:extLst>
   </p:cSld>

</xml_diff>